<commit_message>
add non-linear logistic regression
</commit_message>
<xml_diff>
--- a/CourseAdmin/E5072Weekend.pptx
+++ b/CourseAdmin/E5072Weekend.pptx
@@ -5,11 +5,13 @@
     <p:sldMasterId id="2147484039" r:id="rId1"/>
   </p:sldMasterIdLst>
   <p:notesMasterIdLst>
-    <p:notesMasterId r:id="rId4"/>
+    <p:notesMasterId r:id="rId6"/>
   </p:notesMasterIdLst>
   <p:sldIdLst>
     <p:sldId id="256" r:id="rId2"/>
     <p:sldId id="310" r:id="rId3"/>
+    <p:sldId id="311" r:id="rId4"/>
+    <p:sldId id="312" r:id="rId5"/>
   </p:sldIdLst>
   <p:sldSz cx="12192000" cy="6858000"/>
   <p:notesSz cx="6858000" cy="9144000"/>
@@ -209,7 +211,7 @@
           <a:p>
             <a:fld id="{0A3CE07D-E24D-1946-829B-94070D81B3C6}" type="datetimeFigureOut">
               <a:rPr lang="en-US" smtClean="0"/>
-              <a:t>9/25/17</a:t>
+              <a:t>10/16/17</a:t>
             </a:fld>
             <a:endParaRPr lang="en-US"/>
           </a:p>
@@ -1069,7 +1071,7 @@
           <a:p>
             <a:fld id="{4BDF68E2-58F2-4D09-BE8B-E3BD06533059}" type="datetimeFigureOut">
               <a:rPr lang="en-US" smtClean="0"/>
-              <a:t>9/25/17</a:t>
+              <a:t>10/16/17</a:t>
             </a:fld>
             <a:endParaRPr lang="en-US" dirty="0"/>
           </a:p>
@@ -1249,7 +1251,7 @@
           <a:p>
             <a:fld id="{2E2D6473-DF6D-4702-B328-E0DD40540A4E}" type="datetimeFigureOut">
               <a:rPr lang="en-US" smtClean="0"/>
-              <a:t>9/25/17</a:t>
+              <a:t>10/16/17</a:t>
             </a:fld>
             <a:endParaRPr lang="en-US" dirty="0"/>
           </a:p>
@@ -1425,7 +1427,7 @@
           <a:p>
             <a:fld id="{E26F7E3A-B166-407D-9866-32884E7D5B37}" type="datetimeFigureOut">
               <a:rPr lang="en-US" smtClean="0"/>
-              <a:t>9/25/17</a:t>
+              <a:t>10/16/17</a:t>
             </a:fld>
             <a:endParaRPr lang="en-US" dirty="0"/>
           </a:p>
@@ -1617,7 +1619,7 @@
           <a:p>
             <a:fld id="{528FC5F6-F338-4AE4-BB23-26385BCFC423}" type="datetimeFigureOut">
               <a:rPr lang="en-US" smtClean="0"/>
-              <a:t>9/25/17</a:t>
+              <a:t>10/16/17</a:t>
             </a:fld>
             <a:endParaRPr lang="en-US" dirty="0"/>
           </a:p>
@@ -1934,7 +1936,7 @@
           <a:p>
             <a:fld id="{20EBB0C4-6273-4C6E-B9BD-2EDC30F1CD52}" type="datetimeFigureOut">
               <a:rPr lang="en-US" smtClean="0"/>
-              <a:t>9/25/17</a:t>
+              <a:t>10/16/17</a:t>
             </a:fld>
             <a:endParaRPr lang="en-US" dirty="0"/>
           </a:p>
@@ -2395,7 +2397,7 @@
           <a:p>
             <a:fld id="{19AB4D41-86C1-4908-B66A-0B50CEB3BF29}" type="datetimeFigureOut">
               <a:rPr lang="en-US" smtClean="0"/>
-              <a:t>9/25/17</a:t>
+              <a:t>10/16/17</a:t>
             </a:fld>
             <a:endParaRPr lang="en-US" dirty="0"/>
           </a:p>
@@ -2802,7 +2804,7 @@
           <a:p>
             <a:fld id="{E6426E2C-56C1-4E0D-A793-0088A7FDD37E}" type="datetimeFigureOut">
               <a:rPr lang="en-US" smtClean="0"/>
-              <a:t>9/25/17</a:t>
+              <a:t>10/16/17</a:t>
             </a:fld>
             <a:endParaRPr lang="en-US" dirty="0"/>
           </a:p>
@@ -2916,7 +2918,7 @@
           <a:p>
             <a:fld id="{C8C39B41-D8B5-4052-B551-9B5525EAA8B6}" type="datetimeFigureOut">
               <a:rPr lang="en-US" smtClean="0"/>
-              <a:t>9/25/17</a:t>
+              <a:t>10/16/17</a:t>
             </a:fld>
             <a:endParaRPr lang="en-US" dirty="0"/>
           </a:p>
@@ -3030,7 +3032,7 @@
           <a:p>
             <a:fld id="{4D94136C-8742-45B2-AF27-D93DF72833A9}" type="datetimeFigureOut">
               <a:rPr lang="en-US" smtClean="0"/>
-              <a:t>9/25/17</a:t>
+              <a:t>10/16/17</a:t>
             </a:fld>
             <a:endParaRPr lang="en-US" dirty="0"/>
           </a:p>
@@ -3390,7 +3392,7 @@
           <a:p>
             <a:fld id="{32ABBEA6-7C60-4B02-AE87-00D78D8422AF}" type="datetimeFigureOut">
               <a:rPr lang="en-US" smtClean="0"/>
-              <a:t>9/25/17</a:t>
+              <a:t>10/16/17</a:t>
             </a:fld>
             <a:endParaRPr lang="en-US" dirty="0"/>
           </a:p>
@@ -3899,7 +3901,7 @@
           <a:p>
             <a:fld id="{C9CAD897-D46E-4AD2-BD9B-49DD3E640873}" type="datetimeFigureOut">
               <a:rPr lang="en-US" smtClean="0"/>
-              <a:t>9/25/17</a:t>
+              <a:t>10/16/17</a:t>
             </a:fld>
             <a:endParaRPr lang="en-US" dirty="0"/>
           </a:p>
@@ -4250,7 +4252,7 @@
           <a:p>
             <a:fld id="{98624D31-43A5-475A-80CF-332C9F6DCF35}" type="datetimeFigureOut">
               <a:rPr lang="en-US" smtClean="0"/>
-              <a:t>9/25/17</a:t>
+              <a:t>10/16/17</a:t>
             </a:fld>
             <a:endParaRPr lang="en-US" dirty="0"/>
           </a:p>
@@ -4891,21 +4893,18 @@
               <a:rPr lang="en-US" dirty="0" smtClean="0"/>
               <a:t>Team Presentation (Friday, Dec 1)</a:t>
             </a:r>
-            <a:endParaRPr lang="en-US" dirty="0" smtClean="0"/>
           </a:p>
           <a:p>
             <a:r>
               <a:rPr lang="en-US" dirty="0" smtClean="0"/>
               <a:t>Applied Problems @ frontier of Machine Learning</a:t>
             </a:r>
-            <a:endParaRPr lang="en-US" dirty="0" smtClean="0"/>
           </a:p>
           <a:p>
             <a:r>
               <a:rPr lang="en-US" dirty="0" smtClean="0"/>
               <a:t>Practitioner Interviews</a:t>
             </a:r>
-            <a:endParaRPr lang="en-US" dirty="0" smtClean="0"/>
           </a:p>
           <a:p>
             <a:r>
@@ -4931,7 +4930,6 @@
               <a:rPr lang="en-US" dirty="0" smtClean="0"/>
               <a:t>Notes</a:t>
             </a:r>
-            <a:endParaRPr lang="en-US" dirty="0" smtClean="0"/>
           </a:p>
           <a:p>
             <a:r>
@@ -4946,7 +4944,11 @@
           <a:p>
             <a:r>
               <a:rPr lang="en-US" dirty="0"/>
-              <a:t>Data Sets &amp; Teams assigned week of Oct 2 </a:t>
+              <a:t>Data Sets &amp; Teams assigned week of Oct </a:t>
+            </a:r>
+            <a:r>
+              <a:rPr lang="en-US" dirty="0" smtClean="0"/>
+              <a:t>16 </a:t>
             </a:r>
             <a:endParaRPr lang="en-US" dirty="0" smtClean="0"/>
           </a:p>
@@ -4958,16 +4960,62 @@
           </a:p>
           <a:p>
             <a:r>
-              <a:rPr lang="en-US" smtClean="0"/>
+              <a:rPr lang="en-US" dirty="0" smtClean="0"/>
               <a:t>Saturday, Dec 2 - Teamwork</a:t>
             </a:r>
+          </a:p>
+          <a:p>
             <a:endParaRPr lang="en-US" dirty="0" smtClean="0"/>
           </a:p>
           <a:p>
             <a:endParaRPr lang="en-US" dirty="0" smtClean="0"/>
           </a:p>
-          <a:p>
-            <a:endParaRPr lang="en-US" dirty="0" smtClean="0"/>
+        </p:txBody>
+      </p:sp>
+      <p:sp>
+        <p:nvSpPr>
+          <p:cNvPr id="4" name="Rectangle 3"/>
+          <p:cNvSpPr/>
+          <p:nvPr/>
+        </p:nvSpPr>
+        <p:spPr>
+          <a:xfrm>
+            <a:off x="1614488" y="1285875"/>
+            <a:ext cx="4171950" cy="442913"/>
+          </a:xfrm>
+          <a:prstGeom prst="rect">
+            <a:avLst/>
+          </a:prstGeom>
+          <a:solidFill>
+            <a:schemeClr val="accent4">
+              <a:lumMod val="60000"/>
+              <a:lumOff val="40000"/>
+              <a:alpha val="50000"/>
+            </a:schemeClr>
+          </a:solidFill>
+        </p:spPr>
+        <p:style>
+          <a:lnRef idx="2">
+            <a:schemeClr val="accent1">
+              <a:shade val="50000"/>
+            </a:schemeClr>
+          </a:lnRef>
+          <a:fillRef idx="1">
+            <a:schemeClr val="accent1"/>
+          </a:fillRef>
+          <a:effectRef idx="0">
+            <a:schemeClr val="accent1"/>
+          </a:effectRef>
+          <a:fontRef idx="minor">
+            <a:schemeClr val="lt1"/>
+          </a:fontRef>
+        </p:style>
+        <p:txBody>
+          <a:bodyPr rtlCol="0" anchor="ctr"/>
+          <a:lstStyle/>
+          <a:p>
+            <a:pPr algn="ctr"/>
+            <a:endParaRPr lang="en-US"/>
           </a:p>
         </p:txBody>
       </p:sp>
@@ -4975,6 +5023,368 @@
     <p:extLst>
       <p:ext uri="{BB962C8B-B14F-4D97-AF65-F5344CB8AC3E}">
         <p14:creationId xmlns:p14="http://schemas.microsoft.com/office/powerpoint/2010/main" val="1926790959"/>
+      </p:ext>
+    </p:extLst>
+  </p:cSld>
+  <p:clrMapOvr>
+    <a:masterClrMapping/>
+  </p:clrMapOvr>
+  <p:timing>
+    <p:tnLst>
+      <p:par>
+        <p:cTn id="1" dur="indefinite" restart="never" nodeType="tmRoot"/>
+      </p:par>
+    </p:tnLst>
+  </p:timing>
+</p:sld>
+</file>
+
+<file path=ppt/slides/slide3.xml><?xml version="1.0" encoding="utf-8"?>
+<p:sld xmlns:a="http://schemas.openxmlformats.org/drawingml/2006/main" xmlns:r="http://schemas.openxmlformats.org/officeDocument/2006/relationships" xmlns:p="http://schemas.openxmlformats.org/presentationml/2006/main">
+  <p:cSld>
+    <p:spTree>
+      <p:nvGrpSpPr>
+        <p:cNvPr id="1" name=""/>
+        <p:cNvGrpSpPr/>
+        <p:nvPr/>
+      </p:nvGrpSpPr>
+      <p:grpSpPr>
+        <a:xfrm>
+          <a:off x="0" y="0"/>
+          <a:ext cx="0" cy="0"/>
+          <a:chOff x="0" y="0"/>
+          <a:chExt cx="0" cy="0"/>
+        </a:xfrm>
+      </p:grpSpPr>
+      <p:sp>
+        <p:nvSpPr>
+          <p:cNvPr id="2" name="Title 1"/>
+          <p:cNvSpPr>
+            <a:spLocks noGrp="1"/>
+          </p:cNvSpPr>
+          <p:nvPr>
+            <p:ph type="title"/>
+          </p:nvPr>
+        </p:nvSpPr>
+        <p:spPr>
+          <a:xfrm>
+            <a:off x="1371600" y="685800"/>
+            <a:ext cx="9601200" cy="705678"/>
+          </a:xfrm>
+        </p:spPr>
+        <p:txBody>
+          <a:bodyPr>
+            <a:normAutofit/>
+          </a:bodyPr>
+          <a:lstStyle/>
+          <a:p>
+            <a:r>
+              <a:rPr lang="en-US" dirty="0" smtClean="0"/>
+              <a:t>CAPSTONE: Intensive Weekend (Dec 1, 2, 3</a:t>
+            </a:r>
+            <a:r>
+              <a:rPr lang="en-US" dirty="0" smtClean="0"/>
+              <a:t>)</a:t>
+            </a:r>
+            <a:endParaRPr lang="en-US" dirty="0"/>
+          </a:p>
+        </p:txBody>
+      </p:sp>
+      <p:sp>
+        <p:nvSpPr>
+          <p:cNvPr id="3" name="Content Placeholder 2"/>
+          <p:cNvSpPr>
+            <a:spLocks noGrp="1"/>
+          </p:cNvSpPr>
+          <p:nvPr>
+            <p:ph idx="1"/>
+          </p:nvPr>
+        </p:nvSpPr>
+        <p:spPr>
+          <a:xfrm>
+            <a:off x="1371600" y="2032466"/>
+            <a:ext cx="9601200" cy="4475922"/>
+          </a:xfrm>
+        </p:spPr>
+        <p:txBody>
+          <a:bodyPr>
+            <a:normAutofit/>
+          </a:bodyPr>
+          <a:lstStyle/>
+          <a:p>
+            <a:r>
+              <a:rPr lang="en-US" dirty="0" smtClean="0"/>
+              <a:t>[Sasha </a:t>
+            </a:r>
+            <a:r>
+              <a:rPr lang="mr-IN" dirty="0" smtClean="0"/>
+              <a:t>–</a:t>
+            </a:r>
+            <a:r>
+              <a:rPr lang="en-US" dirty="0" smtClean="0"/>
+              <a:t> please fill in where the teams are posted, where the data is available, etc.]</a:t>
+            </a:r>
+            <a:endParaRPr lang="en-US" dirty="0" smtClean="0"/>
+          </a:p>
+          <a:p>
+            <a:endParaRPr lang="en-US" dirty="0" smtClean="0"/>
+          </a:p>
+          <a:p>
+            <a:endParaRPr lang="en-US" dirty="0" smtClean="0"/>
+          </a:p>
+        </p:txBody>
+      </p:sp>
+      <p:sp>
+        <p:nvSpPr>
+          <p:cNvPr id="5" name="TextBox 4"/>
+          <p:cNvSpPr txBox="1"/>
+          <p:nvPr/>
+        </p:nvSpPr>
+        <p:spPr>
+          <a:xfrm>
+            <a:off x="1371600" y="1279506"/>
+            <a:ext cx="3074240" cy="461665"/>
+          </a:xfrm>
+          <a:prstGeom prst="rect">
+            <a:avLst/>
+          </a:prstGeom>
+          <a:noFill/>
+        </p:spPr>
+        <p:txBody>
+          <a:bodyPr wrap="none" rtlCol="0">
+            <a:spAutoFit/>
+          </a:bodyPr>
+          <a:lstStyle/>
+          <a:p>
+            <a:r>
+              <a:rPr lang="en-US" sz="2400" dirty="0" smtClean="0"/>
+              <a:t>Teams and </a:t>
+            </a:r>
+            <a:r>
+              <a:rPr lang="en-US" sz="2400" smtClean="0"/>
+              <a:t>Data Sets</a:t>
+            </a:r>
+            <a:endParaRPr lang="en-US" sz="2400"/>
+          </a:p>
+        </p:txBody>
+      </p:sp>
+    </p:spTree>
+    <p:extLst>
+      <p:ext uri="{BB962C8B-B14F-4D97-AF65-F5344CB8AC3E}">
+        <p14:creationId xmlns:p14="http://schemas.microsoft.com/office/powerpoint/2010/main" val="1206972055"/>
+      </p:ext>
+    </p:extLst>
+  </p:cSld>
+  <p:clrMapOvr>
+    <a:masterClrMapping/>
+  </p:clrMapOvr>
+  <p:timing>
+    <p:tnLst>
+      <p:par>
+        <p:cTn id="1" dur="indefinite" restart="never" nodeType="tmRoot"/>
+      </p:par>
+    </p:tnLst>
+  </p:timing>
+</p:sld>
+</file>
+
+<file path=ppt/slides/slide4.xml><?xml version="1.0" encoding="utf-8"?>
+<p:sld xmlns:a="http://schemas.openxmlformats.org/drawingml/2006/main" xmlns:r="http://schemas.openxmlformats.org/officeDocument/2006/relationships" xmlns:p="http://schemas.openxmlformats.org/presentationml/2006/main">
+  <p:cSld>
+    <p:spTree>
+      <p:nvGrpSpPr>
+        <p:cNvPr id="1" name=""/>
+        <p:cNvGrpSpPr/>
+        <p:nvPr/>
+      </p:nvGrpSpPr>
+      <p:grpSpPr>
+        <a:xfrm>
+          <a:off x="0" y="0"/>
+          <a:ext cx="0" cy="0"/>
+          <a:chOff x="0" y="0"/>
+          <a:chExt cx="0" cy="0"/>
+        </a:xfrm>
+      </p:grpSpPr>
+      <p:sp>
+        <p:nvSpPr>
+          <p:cNvPr id="2" name="Title 1"/>
+          <p:cNvSpPr>
+            <a:spLocks noGrp="1"/>
+          </p:cNvSpPr>
+          <p:nvPr>
+            <p:ph type="title"/>
+          </p:nvPr>
+        </p:nvSpPr>
+        <p:spPr>
+          <a:xfrm>
+            <a:off x="1371600" y="685800"/>
+            <a:ext cx="9601200" cy="705678"/>
+          </a:xfrm>
+        </p:spPr>
+        <p:txBody>
+          <a:bodyPr>
+            <a:normAutofit/>
+          </a:bodyPr>
+          <a:lstStyle/>
+          <a:p>
+            <a:r>
+              <a:rPr lang="en-US" dirty="0" smtClean="0"/>
+              <a:t>CAPSTONE: Intensive Weekend (Dec 1, 2, 3</a:t>
+            </a:r>
+            <a:r>
+              <a:rPr lang="en-US" dirty="0" smtClean="0"/>
+              <a:t>)</a:t>
+            </a:r>
+            <a:endParaRPr lang="en-US" dirty="0"/>
+          </a:p>
+        </p:txBody>
+      </p:sp>
+      <p:sp>
+        <p:nvSpPr>
+          <p:cNvPr id="3" name="Content Placeholder 2"/>
+          <p:cNvSpPr>
+            <a:spLocks noGrp="1"/>
+          </p:cNvSpPr>
+          <p:nvPr>
+            <p:ph idx="1"/>
+          </p:nvPr>
+        </p:nvSpPr>
+        <p:spPr>
+          <a:xfrm>
+            <a:off x="1371600" y="1741171"/>
+            <a:ext cx="9601200" cy="4475922"/>
+          </a:xfrm>
+        </p:spPr>
+        <p:txBody>
+          <a:bodyPr>
+            <a:normAutofit/>
+          </a:bodyPr>
+          <a:lstStyle/>
+          <a:p>
+            <a:r>
+              <a:rPr lang="en-US" dirty="0" smtClean="0"/>
+              <a:t>Explore</a:t>
+            </a:r>
+          </a:p>
+          <a:p>
+            <a:pPr lvl="1"/>
+            <a:r>
+              <a:rPr lang="en-US" dirty="0" smtClean="0"/>
+              <a:t>What kinds of problems will this data set help solve?</a:t>
+            </a:r>
+          </a:p>
+          <a:p>
+            <a:pPr lvl="1"/>
+            <a:r>
+              <a:rPr lang="en-US" dirty="0" smtClean="0"/>
+              <a:t>List of business problems that can be solved by regression (features, target)</a:t>
+            </a:r>
+          </a:p>
+          <a:p>
+            <a:pPr lvl="1"/>
+            <a:r>
+              <a:rPr lang="en-US" dirty="0" smtClean="0"/>
+              <a:t>List of business problems that can be solved by logistic regression (features, target)</a:t>
+            </a:r>
+          </a:p>
+          <a:p>
+            <a:r>
+              <a:rPr lang="en-US" dirty="0" smtClean="0"/>
+              <a:t>Decide</a:t>
+            </a:r>
+          </a:p>
+          <a:p>
+            <a:pPr lvl="1"/>
+            <a:r>
+              <a:rPr lang="en-US" dirty="0" smtClean="0"/>
+              <a:t>What </a:t>
+            </a:r>
+            <a:r>
+              <a:rPr lang="en-US" i="1" dirty="0" smtClean="0"/>
+              <a:t>one</a:t>
+            </a:r>
+            <a:r>
+              <a:rPr lang="en-US" dirty="0" smtClean="0"/>
+              <a:t> problem is the team going to solve? </a:t>
+            </a:r>
+            <a:r>
+              <a:rPr lang="en-US" dirty="0" smtClean="0"/>
+              <a:t>How and why did you decide to focus on this problem?</a:t>
+            </a:r>
+            <a:endParaRPr lang="en-US" dirty="0" smtClean="0"/>
+          </a:p>
+          <a:p>
+            <a:r>
+              <a:rPr lang="en-US" dirty="0" smtClean="0"/>
+              <a:t>Solve</a:t>
+            </a:r>
+            <a:endParaRPr lang="en-US" dirty="0" smtClean="0"/>
+          </a:p>
+          <a:p>
+            <a:pPr lvl="1"/>
+            <a:r>
+              <a:rPr lang="en-US" dirty="0" smtClean="0"/>
+              <a:t>Visualize</a:t>
+            </a:r>
+          </a:p>
+          <a:p>
+            <a:pPr lvl="1"/>
+            <a:r>
+              <a:rPr lang="en-US" dirty="0" smtClean="0"/>
+              <a:t>Select/construct features</a:t>
+            </a:r>
+          </a:p>
+          <a:p>
+            <a:pPr lvl="1"/>
+            <a:r>
+              <a:rPr lang="en-US" dirty="0" smtClean="0"/>
+              <a:t>Create models and select the one that works best</a:t>
+            </a:r>
+          </a:p>
+          <a:p>
+            <a:pPr lvl="1"/>
+            <a:r>
+              <a:rPr lang="en-US" dirty="0" smtClean="0"/>
+              <a:t>Write up your results</a:t>
+            </a:r>
+            <a:endParaRPr lang="en-US" dirty="0" smtClean="0"/>
+          </a:p>
+        </p:txBody>
+      </p:sp>
+      <p:sp>
+        <p:nvSpPr>
+          <p:cNvPr id="5" name="TextBox 4"/>
+          <p:cNvSpPr txBox="1"/>
+          <p:nvPr/>
+        </p:nvSpPr>
+        <p:spPr>
+          <a:xfrm>
+            <a:off x="1371600" y="1279506"/>
+            <a:ext cx="2552109" cy="461665"/>
+          </a:xfrm>
+          <a:prstGeom prst="rect">
+            <a:avLst/>
+          </a:prstGeom>
+          <a:noFill/>
+        </p:spPr>
+        <p:txBody>
+          <a:bodyPr wrap="none" rtlCol="0">
+            <a:spAutoFit/>
+          </a:bodyPr>
+          <a:lstStyle/>
+          <a:p>
+            <a:r>
+              <a:rPr lang="en-US" sz="2400" dirty="0" smtClean="0"/>
+              <a:t>The Assignment</a:t>
+            </a:r>
+            <a:endParaRPr lang="en-US" sz="2400" dirty="0"/>
+          </a:p>
+        </p:txBody>
+      </p:sp>
+    </p:spTree>
+    <p:extLst>
+      <p:ext uri="{BB962C8B-B14F-4D97-AF65-F5344CB8AC3E}">
+        <p14:creationId xmlns:p14="http://schemas.microsoft.com/office/powerpoint/2010/main" val="1247172858"/>
       </p:ext>
     </p:extLst>
   </p:cSld>

</xml_diff>